<commit_message>
Update Organización DATA CLIMA.pptx
</commit_message>
<xml_diff>
--- a/Organización DATA CLIMA.pptx
+++ b/Organización DATA CLIMA.pptx
@@ -9,7 +9,8 @@
     <p:sldId id="256" r:id="rId3"/>
     <p:sldId id="1279" r:id="rId4"/>
     <p:sldId id="1288" r:id="rId5"/>
-    <p:sldId id="1287" r:id="rId6"/>
+    <p:sldId id="1289" r:id="rId6"/>
+    <p:sldId id="1287" r:id="rId7"/>
   </p:sldIdLst>
   <p:sldSz cx="12192000" cy="6858000"/>
   <p:notesSz cx="6858000" cy="9144000"/>
@@ -108,6 +109,11 @@
       </a:defRPr>
     </a:lvl9pPr>
   </p:defaultTextStyle>
+  <p:extLst>
+    <p:ext uri="{EFAFB233-063F-42B5-8137-9DF3F51BA10A}">
+      <p15:sldGuideLst xmlns:p15="http://schemas.microsoft.com/office/powerpoint/2012/main"/>
+    </p:ext>
+  </p:extLst>
 </p:presentation>
 </file>
 
@@ -260,7 +266,7 @@
           <a:p>
             <a:fld id="{21B218E7-E308-4249-94C9-ACE6C6B3FCA0}" type="datetimeFigureOut">
               <a:rPr lang="es-CL" smtClean="0"/>
-              <a:t>18-10-2020</a:t>
+              <a:t>12-11-2020</a:t>
             </a:fld>
             <a:endParaRPr lang="es-CL"/>
           </a:p>
@@ -460,7 +466,7 @@
           <a:p>
             <a:fld id="{21B218E7-E308-4249-94C9-ACE6C6B3FCA0}" type="datetimeFigureOut">
               <a:rPr lang="es-CL" smtClean="0"/>
-              <a:t>18-10-2020</a:t>
+              <a:t>12-11-2020</a:t>
             </a:fld>
             <a:endParaRPr lang="es-CL"/>
           </a:p>
@@ -670,7 +676,7 @@
           <a:p>
             <a:fld id="{21B218E7-E308-4249-94C9-ACE6C6B3FCA0}" type="datetimeFigureOut">
               <a:rPr lang="es-CL" smtClean="0"/>
-              <a:t>18-10-2020</a:t>
+              <a:t>12-11-2020</a:t>
             </a:fld>
             <a:endParaRPr lang="es-CL"/>
           </a:p>
@@ -896,7 +902,7 @@
             <a:pPr rtl="0"/>
             <a:fld id="{CCF7C550-AA50-4D55-A2F8-6E96CDCB20DF}" type="datetime1">
               <a:rPr lang="es-ES" noProof="0" smtClean="0"/>
-              <a:t>18/10/2020</a:t>
+              <a:t>12/11/2020</a:t>
             </a:fld>
             <a:endParaRPr lang="es-ES" noProof="0"/>
           </a:p>
@@ -1156,7 +1162,7 @@
             <a:pPr rtl="0"/>
             <a:fld id="{4CC7EBFA-2694-446B-990D-0A457AF8F575}" type="datetime1">
               <a:rPr lang="es-ES" noProof="0" smtClean="0"/>
-              <a:t>18/10/2020</a:t>
+              <a:t>12/11/2020</a:t>
             </a:fld>
             <a:endParaRPr lang="es-ES" noProof="0"/>
           </a:p>
@@ -1416,7 +1422,7 @@
             <a:pPr rtl="0"/>
             <a:fld id="{FCFA2817-3E78-4C10-BC87-41FCE4C7141A}" type="datetime1">
               <a:rPr lang="es-ES" noProof="0" smtClean="0"/>
-              <a:t>18/10/2020</a:t>
+              <a:t>12/11/2020</a:t>
             </a:fld>
             <a:endParaRPr lang="es-ES" noProof="0"/>
           </a:p>
@@ -1742,7 +1748,7 @@
             <a:pPr rtl="0"/>
             <a:fld id="{22D4EB97-C908-46A1-B4A2-591227C14462}" type="datetime1">
               <a:rPr lang="es-ES" noProof="0" smtClean="0"/>
-              <a:t>18/10/2020</a:t>
+              <a:t>12/11/2020</a:t>
             </a:fld>
             <a:endParaRPr lang="es-ES" noProof="0"/>
           </a:p>
@@ -2141,7 +2147,7 @@
             <a:pPr rtl="0"/>
             <a:fld id="{C79239A9-6394-420C-B91E-98E4CD72BAD4}" type="datetime1">
               <a:rPr lang="es-ES" noProof="0" smtClean="0"/>
-              <a:t>18/10/2020</a:t>
+              <a:t>12/11/2020</a:t>
             </a:fld>
             <a:endParaRPr lang="es-ES" noProof="0"/>
           </a:p>
@@ -2262,7 +2268,7 @@
             <a:pPr rtl="0"/>
             <a:fld id="{8EA2CCA1-7D31-4460-8697-EDDBFE29CF24}" type="datetime1">
               <a:rPr lang="es-ES" noProof="0" smtClean="0"/>
-              <a:t>18/10/2020</a:t>
+              <a:t>12/11/2020</a:t>
             </a:fld>
             <a:endParaRPr lang="es-ES" noProof="0"/>
           </a:p>
@@ -2360,7 +2366,7 @@
             <a:pPr rtl="0"/>
             <a:fld id="{9EDA9DE3-06EA-4F7B-A8A9-DC3087964CCB}" type="datetime1">
               <a:rPr lang="es-ES" noProof="0" smtClean="0"/>
-              <a:t>18/10/2020</a:t>
+              <a:t>12/11/2020</a:t>
             </a:fld>
             <a:endParaRPr lang="es-ES" noProof="0"/>
           </a:p>
@@ -2657,7 +2663,7 @@
             <a:pPr rtl="0"/>
             <a:fld id="{524AD719-265A-4FD9-9B93-D5A5E8AB6C60}" type="datetime1">
               <a:rPr lang="es-ES" noProof="0" smtClean="0"/>
-              <a:t>18/10/2020</a:t>
+              <a:t>12/11/2020</a:t>
             </a:fld>
             <a:endParaRPr lang="es-ES" noProof="0"/>
           </a:p>
@@ -2852,7 +2858,7 @@
           <a:p>
             <a:fld id="{21B218E7-E308-4249-94C9-ACE6C6B3FCA0}" type="datetimeFigureOut">
               <a:rPr lang="es-CL" smtClean="0"/>
-              <a:t>18-10-2020</a:t>
+              <a:t>12-11-2020</a:t>
             </a:fld>
             <a:endParaRPr lang="es-CL"/>
           </a:p>
@@ -3145,7 +3151,7 @@
             <a:pPr rtl="0"/>
             <a:fld id="{F110C84E-63D5-48C8-B46B-8D0328D07C38}" type="datetime1">
               <a:rPr lang="es-ES" noProof="0" smtClean="0"/>
-              <a:t>18/10/2020</a:t>
+              <a:t>12/11/2020</a:t>
             </a:fld>
             <a:endParaRPr lang="es-ES" noProof="0"/>
           </a:p>
@@ -3352,7 +3358,7 @@
             <a:pPr rtl="0"/>
             <a:fld id="{80A094E1-B490-4358-B74B-E39F14EB1973}" type="datetime1">
               <a:rPr lang="es-ES" noProof="0" smtClean="0"/>
-              <a:t>18/10/2020</a:t>
+              <a:t>12/11/2020</a:t>
             </a:fld>
             <a:endParaRPr lang="es-ES" noProof="0"/>
           </a:p>
@@ -3534,7 +3540,7 @@
             <a:pPr rtl="0"/>
             <a:fld id="{4CF70C78-98A0-412B-BEFE-D134CA5D2DF2}" type="datetime1">
               <a:rPr lang="es-ES" noProof="0" smtClean="0"/>
-              <a:t>18/10/2020</a:t>
+              <a:t>12/11/2020</a:t>
             </a:fld>
             <a:endParaRPr lang="es-ES" noProof="0"/>
           </a:p>
@@ -3840,7 +3846,7 @@
           <a:p>
             <a:fld id="{21B218E7-E308-4249-94C9-ACE6C6B3FCA0}" type="datetimeFigureOut">
               <a:rPr lang="es-CL" smtClean="0"/>
-              <a:t>18-10-2020</a:t>
+              <a:t>12-11-2020</a:t>
             </a:fld>
             <a:endParaRPr lang="es-CL"/>
           </a:p>
@@ -4108,7 +4114,7 @@
           <a:p>
             <a:fld id="{21B218E7-E308-4249-94C9-ACE6C6B3FCA0}" type="datetimeFigureOut">
               <a:rPr lang="es-CL" smtClean="0"/>
-              <a:t>18-10-2020</a:t>
+              <a:t>12-11-2020</a:t>
             </a:fld>
             <a:endParaRPr lang="es-CL"/>
           </a:p>
@@ -4523,7 +4529,7 @@
           <a:p>
             <a:fld id="{21B218E7-E308-4249-94C9-ACE6C6B3FCA0}" type="datetimeFigureOut">
               <a:rPr lang="es-CL" smtClean="0"/>
-              <a:t>18-10-2020</a:t>
+              <a:t>12-11-2020</a:t>
             </a:fld>
             <a:endParaRPr lang="es-CL"/>
           </a:p>
@@ -4665,7 +4671,7 @@
           <a:p>
             <a:fld id="{21B218E7-E308-4249-94C9-ACE6C6B3FCA0}" type="datetimeFigureOut">
               <a:rPr lang="es-CL" smtClean="0"/>
-              <a:t>18-10-2020</a:t>
+              <a:t>12-11-2020</a:t>
             </a:fld>
             <a:endParaRPr lang="es-CL"/>
           </a:p>
@@ -4778,7 +4784,7 @@
           <a:p>
             <a:fld id="{21B218E7-E308-4249-94C9-ACE6C6B3FCA0}" type="datetimeFigureOut">
               <a:rPr lang="es-CL" smtClean="0"/>
-              <a:t>18-10-2020</a:t>
+              <a:t>12-11-2020</a:t>
             </a:fld>
             <a:endParaRPr lang="es-CL"/>
           </a:p>
@@ -5091,7 +5097,7 @@
           <a:p>
             <a:fld id="{21B218E7-E308-4249-94C9-ACE6C6B3FCA0}" type="datetimeFigureOut">
               <a:rPr lang="es-CL" smtClean="0"/>
-              <a:t>18-10-2020</a:t>
+              <a:t>12-11-2020</a:t>
             </a:fld>
             <a:endParaRPr lang="es-CL"/>
           </a:p>
@@ -5380,7 +5386,7 @@
           <a:p>
             <a:fld id="{21B218E7-E308-4249-94C9-ACE6C6B3FCA0}" type="datetimeFigureOut">
               <a:rPr lang="es-CL" smtClean="0"/>
-              <a:t>18-10-2020</a:t>
+              <a:t>12-11-2020</a:t>
             </a:fld>
             <a:endParaRPr lang="es-CL"/>
           </a:p>
@@ -5623,7 +5629,7 @@
           <a:p>
             <a:fld id="{21B218E7-E308-4249-94C9-ACE6C6B3FCA0}" type="datetimeFigureOut">
               <a:rPr lang="es-CL" smtClean="0"/>
-              <a:t>18-10-2020</a:t>
+              <a:t>12-11-2020</a:t>
             </a:fld>
             <a:endParaRPr lang="es-CL"/>
           </a:p>
@@ -6177,7 +6183,7 @@
             <a:pPr rtl="0"/>
             <a:fld id="{E274E21D-7E86-4F59-BA25-7478C6191663}" type="datetime1">
               <a:rPr lang="es-ES" noProof="0" smtClean="0"/>
-              <a:t>18/10/2020</a:t>
+              <a:t>12/11/2020</a:t>
             </a:fld>
             <a:endParaRPr lang="es-ES" noProof="0"/>
           </a:p>
@@ -11488,10 +11494,10 @@
       </p:sp>
       <p:sp>
         <p:nvSpPr>
-          <p:cNvPr id="45" name="CuadroTexto 44">
-            <a:extLst>
-              <a:ext uri="{FF2B5EF4-FFF2-40B4-BE49-F238E27FC236}">
-                <a16:creationId xmlns:a16="http://schemas.microsoft.com/office/drawing/2014/main" id="{D8878651-2B27-4F39-AB19-230C2D492DC0}"/>
+          <p:cNvPr id="39" name="CuadroTexto 38">
+            <a:extLst>
+              <a:ext uri="{FF2B5EF4-FFF2-40B4-BE49-F238E27FC236}">
+                <a16:creationId xmlns:a16="http://schemas.microsoft.com/office/drawing/2014/main" id="{405F0539-307F-4620-9503-B943842D5FEA}"/>
               </a:ext>
             </a:extLst>
           </p:cNvPr>
@@ -11500,7 +11506,606 @@
         </p:nvSpPr>
         <p:spPr>
           <a:xfrm>
-            <a:off x="783733" y="2019585"/>
+            <a:off x="767646" y="2063201"/>
+            <a:ext cx="1731945" cy="307777"/>
+          </a:xfrm>
+          <a:prstGeom prst="rect">
+            <a:avLst/>
+          </a:prstGeom>
+          <a:solidFill>
+            <a:schemeClr val="accent3">
+              <a:lumMod val="60000"/>
+              <a:lumOff val="40000"/>
+            </a:schemeClr>
+          </a:solidFill>
+          <a:ln>
+            <a:solidFill>
+              <a:schemeClr val="accent3">
+                <a:lumMod val="75000"/>
+              </a:schemeClr>
+            </a:solidFill>
+          </a:ln>
+        </p:spPr>
+        <p:txBody>
+          <a:bodyPr wrap="square" rtlCol="0">
+            <a:spAutoFit/>
+          </a:bodyPr>
+          <a:lstStyle/>
+          <a:p>
+            <a:pPr marL="0" marR="0" lvl="0" indent="0" algn="l" defTabSz="914400" rtl="0" eaLnBrk="0" fontAlgn="base" latinLnBrk="0" hangingPunct="0">
+              <a:lnSpc>
+                <a:spcPct val="100000"/>
+              </a:lnSpc>
+              <a:spcBef>
+                <a:spcPct val="0"/>
+              </a:spcBef>
+              <a:spcAft>
+                <a:spcPct val="0"/>
+              </a:spcAft>
+              <a:buClrTx/>
+              <a:buSzTx/>
+              <a:buFontTx/>
+              <a:buNone/>
+              <a:tabLst/>
+              <a:defRPr/>
+            </a:pPr>
+            <a:r>
+              <a:rPr kumimoji="0" lang="es-CL" sz="1400" b="0" i="0" u="none" strike="noStrike" kern="1200" cap="none" spc="0" normalizeH="0" baseline="0" noProof="0" dirty="0">
+                <a:ln>
+                  <a:noFill/>
+                </a:ln>
+                <a:solidFill>
+                  <a:prstClr val="black"/>
+                </a:solidFill>
+                <a:effectLst/>
+                <a:uLnTx/>
+                <a:uFillTx/>
+                <a:latin typeface="Times" pitchFamily="-97" charset="0"/>
+                <a:ea typeface="+mn-ea"/>
+                <a:cs typeface="+mn-cs"/>
+              </a:rPr>
+              <a:t>Conceptos Generales</a:t>
+            </a:r>
+          </a:p>
+        </p:txBody>
+      </p:sp>
+      <p:sp>
+        <p:nvSpPr>
+          <p:cNvPr id="41" name="CuadroTexto 40">
+            <a:extLst>
+              <a:ext uri="{FF2B5EF4-FFF2-40B4-BE49-F238E27FC236}">
+                <a16:creationId xmlns:a16="http://schemas.microsoft.com/office/drawing/2014/main" id="{6A6CF6FE-112B-492E-908B-C6B90341B773}"/>
+              </a:ext>
+            </a:extLst>
+          </p:cNvPr>
+          <p:cNvSpPr txBox="1"/>
+          <p:nvPr/>
+        </p:nvSpPr>
+        <p:spPr>
+          <a:xfrm>
+            <a:off x="767646" y="2639487"/>
+            <a:ext cx="4081670" cy="923330"/>
+          </a:xfrm>
+          <a:prstGeom prst="rect">
+            <a:avLst/>
+          </a:prstGeom>
+          <a:noFill/>
+          <a:ln w="9525">
+            <a:solidFill>
+              <a:schemeClr val="accent3">
+                <a:lumMod val="75000"/>
+              </a:schemeClr>
+            </a:solidFill>
+          </a:ln>
+        </p:spPr>
+        <p:txBody>
+          <a:bodyPr wrap="square" rtlCol="0">
+            <a:spAutoFit/>
+          </a:bodyPr>
+          <a:lstStyle/>
+          <a:p>
+            <a:pPr marL="285750" indent="-285750">
+              <a:buClr>
+                <a:schemeClr val="accent3">
+                  <a:lumMod val="75000"/>
+                </a:schemeClr>
+              </a:buClr>
+              <a:buFont typeface="Arial" panose="020B0604020202020204" pitchFamily="34" charset="0"/>
+              <a:buChar char="•"/>
+            </a:pPr>
+            <a:r>
+              <a:rPr lang="es-CL" dirty="0"/>
+              <a:t>Referir a Texto Conceptos Generales</a:t>
+            </a:r>
+          </a:p>
+          <a:p>
+            <a:pPr marL="285750" indent="-285750">
+              <a:buClr>
+                <a:schemeClr val="accent3">
+                  <a:lumMod val="75000"/>
+                </a:schemeClr>
+              </a:buClr>
+              <a:buFont typeface="Arial" panose="020B0604020202020204" pitchFamily="34" charset="0"/>
+              <a:buChar char="•"/>
+            </a:pPr>
+            <a:r>
+              <a:rPr lang="es-CL" dirty="0"/>
+              <a:t>Discutir si se utilizan figuras y </a:t>
+            </a:r>
+            <a:r>
+              <a:rPr lang="es-CL" dirty="0" err="1"/>
+              <a:t>GIFs</a:t>
+            </a:r>
+            <a:r>
+              <a:rPr lang="es-CL" dirty="0"/>
+              <a:t> adjuntos o si se crearán</a:t>
+            </a:r>
+          </a:p>
+        </p:txBody>
+      </p:sp>
+      <p:sp>
+        <p:nvSpPr>
+          <p:cNvPr id="44" name="CuadroTexto 43">
+            <a:extLst>
+              <a:ext uri="{FF2B5EF4-FFF2-40B4-BE49-F238E27FC236}">
+                <a16:creationId xmlns:a16="http://schemas.microsoft.com/office/drawing/2014/main" id="{44C9DC57-66E6-461A-8E43-FAD6E043A4DF}"/>
+              </a:ext>
+            </a:extLst>
+          </p:cNvPr>
+          <p:cNvSpPr txBox="1"/>
+          <p:nvPr/>
+        </p:nvSpPr>
+        <p:spPr>
+          <a:xfrm>
+            <a:off x="2340429" y="3581301"/>
+            <a:ext cx="936104" cy="338554"/>
+          </a:xfrm>
+          <a:prstGeom prst="rect">
+            <a:avLst/>
+          </a:prstGeom>
+          <a:noFill/>
+        </p:spPr>
+        <p:txBody>
+          <a:bodyPr wrap="square" rtlCol="0">
+            <a:spAutoFit/>
+          </a:bodyPr>
+          <a:lstStyle/>
+          <a:p>
+            <a:pPr marL="0" marR="0" lvl="0" indent="0" algn="l" defTabSz="914400" rtl="0" eaLnBrk="0" fontAlgn="base" latinLnBrk="0" hangingPunct="0">
+              <a:lnSpc>
+                <a:spcPct val="100000"/>
+              </a:lnSpc>
+              <a:spcBef>
+                <a:spcPct val="0"/>
+              </a:spcBef>
+              <a:spcAft>
+                <a:spcPct val="0"/>
+              </a:spcAft>
+              <a:buClrTx/>
+              <a:buSzTx/>
+              <a:buFontTx/>
+              <a:buNone/>
+              <a:tabLst/>
+              <a:defRPr/>
+            </a:pPr>
+            <a:r>
+              <a:rPr kumimoji="0" lang="es-CL" sz="1600" b="1" i="0" u="none" strike="noStrike" kern="1200" cap="none" spc="0" normalizeH="0" baseline="0" noProof="0" dirty="0">
+                <a:ln>
+                  <a:noFill/>
+                </a:ln>
+                <a:solidFill>
+                  <a:prstClr val="black"/>
+                </a:solidFill>
+                <a:effectLst/>
+                <a:uLnTx/>
+                <a:uFillTx/>
+                <a:latin typeface="Times" pitchFamily="-97" charset="0"/>
+                <a:ea typeface="+mn-ea"/>
+                <a:cs typeface="+mn-cs"/>
+              </a:rPr>
+              <a:t>Free</a:t>
+            </a:r>
+          </a:p>
+        </p:txBody>
+      </p:sp>
+    </p:spTree>
+    <p:extLst>
+      <p:ext uri="{BB962C8B-B14F-4D97-AF65-F5344CB8AC3E}">
+        <p14:creationId xmlns:p14="http://schemas.microsoft.com/office/powerpoint/2010/main" val="2643240212"/>
+      </p:ext>
+    </p:extLst>
+  </p:cSld>
+  <p:clrMapOvr>
+    <a:masterClrMapping/>
+  </p:clrMapOvr>
+</p:sld>
+</file>
+
+<file path=ppt/slides/slide4.xml><?xml version="1.0" encoding="utf-8"?>
+<p:sld xmlns:a="http://schemas.openxmlformats.org/drawingml/2006/main" xmlns:r="http://schemas.openxmlformats.org/officeDocument/2006/relationships" xmlns:p="http://schemas.openxmlformats.org/presentationml/2006/main">
+  <p:cSld>
+    <p:spTree>
+      <p:nvGrpSpPr>
+        <p:cNvPr id="1" name=""/>
+        <p:cNvGrpSpPr/>
+        <p:nvPr/>
+      </p:nvGrpSpPr>
+      <p:grpSpPr>
+        <a:xfrm>
+          <a:off x="0" y="0"/>
+          <a:ext cx="0" cy="0"/>
+          <a:chOff x="0" y="0"/>
+          <a:chExt cx="0" cy="0"/>
+        </a:xfrm>
+      </p:grpSpPr>
+      <p:sp>
+        <p:nvSpPr>
+          <p:cNvPr id="2" name="Título 1">
+            <a:extLst>
+              <a:ext uri="{FF2B5EF4-FFF2-40B4-BE49-F238E27FC236}">
+                <a16:creationId xmlns:a16="http://schemas.microsoft.com/office/drawing/2014/main" id="{B7567D67-0D69-4584-B3D4-6BEC4F0BC485}"/>
+              </a:ext>
+            </a:extLst>
+          </p:cNvPr>
+          <p:cNvSpPr>
+            <a:spLocks noGrp="1"/>
+          </p:cNvSpPr>
+          <p:nvPr>
+            <p:ph type="title"/>
+          </p:nvPr>
+        </p:nvSpPr>
+        <p:spPr/>
+        <p:txBody>
+          <a:bodyPr/>
+          <a:lstStyle/>
+          <a:p>
+            <a:r>
+              <a:rPr lang="es-CL" dirty="0"/>
+              <a:t>Colección DATA clima</a:t>
+            </a:r>
+          </a:p>
+        </p:txBody>
+      </p:sp>
+      <p:cxnSp>
+        <p:nvCxnSpPr>
+          <p:cNvPr id="6" name="Conector recto de flecha 5">
+            <a:extLst>
+              <a:ext uri="{FF2B5EF4-FFF2-40B4-BE49-F238E27FC236}">
+                <a16:creationId xmlns:a16="http://schemas.microsoft.com/office/drawing/2014/main" id="{2CAE975C-67FC-46F1-9FF8-2FBB57522603}"/>
+              </a:ext>
+            </a:extLst>
+          </p:cNvPr>
+          <p:cNvCxnSpPr>
+            <a:cxnSpLocks/>
+          </p:cNvCxnSpPr>
+          <p:nvPr/>
+        </p:nvCxnSpPr>
+        <p:spPr>
+          <a:xfrm flipV="1">
+            <a:off x="6705262" y="319540"/>
+            <a:ext cx="1262946" cy="949221"/>
+          </a:xfrm>
+          <a:prstGeom prst="straightConnector1">
+            <a:avLst/>
+          </a:prstGeom>
+          <a:ln>
+            <a:solidFill>
+              <a:schemeClr val="tx2">
+                <a:lumMod val="75000"/>
+              </a:schemeClr>
+            </a:solidFill>
+            <a:tailEnd type="triangle"/>
+          </a:ln>
+        </p:spPr>
+        <p:style>
+          <a:lnRef idx="1">
+            <a:schemeClr val="accent1"/>
+          </a:lnRef>
+          <a:fillRef idx="0">
+            <a:schemeClr val="accent1"/>
+          </a:fillRef>
+          <a:effectRef idx="0">
+            <a:schemeClr val="accent1"/>
+          </a:effectRef>
+          <a:fontRef idx="minor">
+            <a:schemeClr val="tx1"/>
+          </a:fontRef>
+        </p:style>
+      </p:cxnSp>
+      <p:cxnSp>
+        <p:nvCxnSpPr>
+          <p:cNvPr id="8" name="Conector recto 7">
+            <a:extLst>
+              <a:ext uri="{FF2B5EF4-FFF2-40B4-BE49-F238E27FC236}">
+                <a16:creationId xmlns:a16="http://schemas.microsoft.com/office/drawing/2014/main" id="{DF976C14-2EBA-4582-8D53-69D94302B376}"/>
+              </a:ext>
+            </a:extLst>
+          </p:cNvPr>
+          <p:cNvCxnSpPr>
+            <a:cxnSpLocks/>
+          </p:cNvCxnSpPr>
+          <p:nvPr/>
+        </p:nvCxnSpPr>
+        <p:spPr>
+          <a:xfrm>
+            <a:off x="5879976" y="1268760"/>
+            <a:ext cx="825286" cy="0"/>
+          </a:xfrm>
+          <a:prstGeom prst="line">
+            <a:avLst/>
+          </a:prstGeom>
+          <a:ln>
+            <a:solidFill>
+              <a:schemeClr val="tx2">
+                <a:lumMod val="75000"/>
+              </a:schemeClr>
+            </a:solidFill>
+          </a:ln>
+        </p:spPr>
+        <p:style>
+          <a:lnRef idx="1">
+            <a:schemeClr val="accent1"/>
+          </a:lnRef>
+          <a:fillRef idx="0">
+            <a:schemeClr val="accent1"/>
+          </a:fillRef>
+          <a:effectRef idx="0">
+            <a:schemeClr val="accent1"/>
+          </a:effectRef>
+          <a:fontRef idx="minor">
+            <a:schemeClr val="tx1"/>
+          </a:fontRef>
+        </p:style>
+      </p:cxnSp>
+      <p:cxnSp>
+        <p:nvCxnSpPr>
+          <p:cNvPr id="11" name="Conector recto de flecha 10">
+            <a:extLst>
+              <a:ext uri="{FF2B5EF4-FFF2-40B4-BE49-F238E27FC236}">
+                <a16:creationId xmlns:a16="http://schemas.microsoft.com/office/drawing/2014/main" id="{2D960987-5BA1-4919-95E0-B35D7FC5E8EB}"/>
+              </a:ext>
+            </a:extLst>
+          </p:cNvPr>
+          <p:cNvCxnSpPr>
+            <a:cxnSpLocks/>
+          </p:cNvCxnSpPr>
+          <p:nvPr/>
+        </p:nvCxnSpPr>
+        <p:spPr>
+          <a:xfrm flipV="1">
+            <a:off x="6705262" y="705247"/>
+            <a:ext cx="1262946" cy="563514"/>
+          </a:xfrm>
+          <a:prstGeom prst="straightConnector1">
+            <a:avLst/>
+          </a:prstGeom>
+          <a:ln>
+            <a:solidFill>
+              <a:schemeClr val="tx2">
+                <a:lumMod val="75000"/>
+              </a:schemeClr>
+            </a:solidFill>
+            <a:tailEnd type="triangle"/>
+          </a:ln>
+        </p:spPr>
+        <p:style>
+          <a:lnRef idx="1">
+            <a:schemeClr val="accent1"/>
+          </a:lnRef>
+          <a:fillRef idx="0">
+            <a:schemeClr val="accent1"/>
+          </a:fillRef>
+          <a:effectRef idx="0">
+            <a:schemeClr val="accent1"/>
+          </a:effectRef>
+          <a:fontRef idx="minor">
+            <a:schemeClr val="tx1"/>
+          </a:fontRef>
+        </p:style>
+      </p:cxnSp>
+      <p:cxnSp>
+        <p:nvCxnSpPr>
+          <p:cNvPr id="15" name="Conector recto de flecha 14">
+            <a:extLst>
+              <a:ext uri="{FF2B5EF4-FFF2-40B4-BE49-F238E27FC236}">
+                <a16:creationId xmlns:a16="http://schemas.microsoft.com/office/drawing/2014/main" id="{807455D9-571B-4E10-9F44-F57E5E5166EB}"/>
+              </a:ext>
+            </a:extLst>
+          </p:cNvPr>
+          <p:cNvCxnSpPr>
+            <a:cxnSpLocks/>
+          </p:cNvCxnSpPr>
+          <p:nvPr/>
+        </p:nvCxnSpPr>
+        <p:spPr>
+          <a:xfrm flipV="1">
+            <a:off x="6705262" y="1086586"/>
+            <a:ext cx="1262946" cy="182174"/>
+          </a:xfrm>
+          <a:prstGeom prst="straightConnector1">
+            <a:avLst/>
+          </a:prstGeom>
+          <a:ln>
+            <a:solidFill>
+              <a:schemeClr val="tx2">
+                <a:lumMod val="75000"/>
+              </a:schemeClr>
+            </a:solidFill>
+            <a:tailEnd type="triangle"/>
+          </a:ln>
+        </p:spPr>
+        <p:style>
+          <a:lnRef idx="1">
+            <a:schemeClr val="accent1"/>
+          </a:lnRef>
+          <a:fillRef idx="0">
+            <a:schemeClr val="accent1"/>
+          </a:fillRef>
+          <a:effectRef idx="0">
+            <a:schemeClr val="accent1"/>
+          </a:effectRef>
+          <a:fontRef idx="minor">
+            <a:schemeClr val="tx1"/>
+          </a:fontRef>
+        </p:style>
+      </p:cxnSp>
+      <p:sp>
+        <p:nvSpPr>
+          <p:cNvPr id="18" name="CuadroTexto 17">
+            <a:extLst>
+              <a:ext uri="{FF2B5EF4-FFF2-40B4-BE49-F238E27FC236}">
+                <a16:creationId xmlns:a16="http://schemas.microsoft.com/office/drawing/2014/main" id="{BC0683E7-CFC4-47E8-86BC-9EA8E791F70B}"/>
+              </a:ext>
+            </a:extLst>
+          </p:cNvPr>
+          <p:cNvSpPr txBox="1"/>
+          <p:nvPr/>
+        </p:nvSpPr>
+        <p:spPr>
+          <a:xfrm>
+            <a:off x="5879976" y="991762"/>
+            <a:ext cx="936104" cy="276998"/>
+          </a:xfrm>
+          <a:prstGeom prst="rect">
+            <a:avLst/>
+          </a:prstGeom>
+          <a:noFill/>
+        </p:spPr>
+        <p:txBody>
+          <a:bodyPr wrap="square" rtlCol="0">
+            <a:spAutoFit/>
+          </a:bodyPr>
+          <a:lstStyle/>
+          <a:p>
+            <a:pPr marL="0" marR="0" lvl="0" indent="0" algn="l" defTabSz="914400" rtl="0" eaLnBrk="0" fontAlgn="base" latinLnBrk="0" hangingPunct="0">
+              <a:lnSpc>
+                <a:spcPct val="100000"/>
+              </a:lnSpc>
+              <a:spcBef>
+                <a:spcPct val="0"/>
+              </a:spcBef>
+              <a:spcAft>
+                <a:spcPct val="0"/>
+              </a:spcAft>
+              <a:buClrTx/>
+              <a:buSzTx/>
+              <a:buFontTx/>
+              <a:buNone/>
+              <a:tabLst/>
+              <a:defRPr/>
+            </a:pPr>
+            <a:r>
+              <a:rPr kumimoji="0" lang="es-CL" sz="1200" b="0" i="1" u="none" strike="noStrike" kern="1200" cap="none" spc="0" normalizeH="0" baseline="0" noProof="0" dirty="0">
+                <a:ln>
+                  <a:noFill/>
+                </a:ln>
+                <a:solidFill>
+                  <a:prstClr val="black"/>
+                </a:solidFill>
+                <a:effectLst/>
+                <a:uLnTx/>
+                <a:uFillTx/>
+                <a:latin typeface="Times" pitchFamily="-97" charset="0"/>
+                <a:ea typeface="+mn-ea"/>
+                <a:cs typeface="+mn-cs"/>
+              </a:rPr>
+              <a:t>Categorías</a:t>
+            </a:r>
+          </a:p>
+        </p:txBody>
+      </p:sp>
+      <p:sp>
+        <p:nvSpPr>
+          <p:cNvPr id="19" name="CuadroTexto 18">
+            <a:extLst>
+              <a:ext uri="{FF2B5EF4-FFF2-40B4-BE49-F238E27FC236}">
+                <a16:creationId xmlns:a16="http://schemas.microsoft.com/office/drawing/2014/main" id="{1562B58E-5CC4-4052-96E1-05699A57B104}"/>
+              </a:ext>
+            </a:extLst>
+          </p:cNvPr>
+          <p:cNvSpPr txBox="1"/>
+          <p:nvPr/>
+        </p:nvSpPr>
+        <p:spPr>
+          <a:xfrm>
+            <a:off x="8036463" y="165650"/>
+            <a:ext cx="1731945" cy="307777"/>
+          </a:xfrm>
+          <a:prstGeom prst="rect">
+            <a:avLst/>
+          </a:prstGeom>
+          <a:solidFill>
+            <a:schemeClr val="accent3">
+              <a:lumMod val="60000"/>
+              <a:lumOff val="40000"/>
+            </a:schemeClr>
+          </a:solidFill>
+          <a:ln>
+            <a:solidFill>
+              <a:schemeClr val="accent3">
+                <a:lumMod val="75000"/>
+              </a:schemeClr>
+            </a:solidFill>
+          </a:ln>
+        </p:spPr>
+        <p:txBody>
+          <a:bodyPr wrap="square" rtlCol="0">
+            <a:spAutoFit/>
+          </a:bodyPr>
+          <a:lstStyle/>
+          <a:p>
+            <a:pPr marL="0" marR="0" lvl="0" indent="0" algn="l" defTabSz="914400" rtl="0" eaLnBrk="0" fontAlgn="base" latinLnBrk="0" hangingPunct="0">
+              <a:lnSpc>
+                <a:spcPct val="100000"/>
+              </a:lnSpc>
+              <a:spcBef>
+                <a:spcPct val="0"/>
+              </a:spcBef>
+              <a:spcAft>
+                <a:spcPct val="0"/>
+              </a:spcAft>
+              <a:buClrTx/>
+              <a:buSzTx/>
+              <a:buFontTx/>
+              <a:buNone/>
+              <a:tabLst/>
+              <a:defRPr/>
+            </a:pPr>
+            <a:r>
+              <a:rPr kumimoji="0" lang="es-CL" sz="1400" b="0" i="0" u="none" strike="noStrike" kern="1200" cap="none" spc="0" normalizeH="0" baseline="0" noProof="0" dirty="0">
+                <a:ln>
+                  <a:noFill/>
+                </a:ln>
+                <a:solidFill>
+                  <a:prstClr val="black"/>
+                </a:solidFill>
+                <a:effectLst/>
+                <a:uLnTx/>
+                <a:uFillTx/>
+                <a:latin typeface="Times" pitchFamily="-97" charset="0"/>
+                <a:ea typeface="+mn-ea"/>
+                <a:cs typeface="+mn-cs"/>
+              </a:rPr>
+              <a:t>Conceptos Generales</a:t>
+            </a:r>
+          </a:p>
+        </p:txBody>
+      </p:sp>
+      <p:sp>
+        <p:nvSpPr>
+          <p:cNvPr id="22" name="CuadroTexto 21">
+            <a:extLst>
+              <a:ext uri="{FF2B5EF4-FFF2-40B4-BE49-F238E27FC236}">
+                <a16:creationId xmlns:a16="http://schemas.microsoft.com/office/drawing/2014/main" id="{4FB5B52C-85BB-4558-820D-0665660D4B24}"/>
+              </a:ext>
+            </a:extLst>
+          </p:cNvPr>
+          <p:cNvSpPr txBox="1"/>
+          <p:nvPr/>
+        </p:nvSpPr>
+        <p:spPr>
+          <a:xfrm>
+            <a:off x="8036463" y="541933"/>
             <a:ext cx="2091985" cy="307777"/>
           </a:xfrm>
           <a:prstGeom prst="rect">
@@ -11563,10 +12168,10 @@
       </p:sp>
       <p:sp>
         <p:nvSpPr>
-          <p:cNvPr id="49" name="CuadroTexto 48">
-            <a:extLst>
-              <a:ext uri="{FF2B5EF4-FFF2-40B4-BE49-F238E27FC236}">
-                <a16:creationId xmlns:a16="http://schemas.microsoft.com/office/drawing/2014/main" id="{BD7C2829-65D1-49B9-ACED-7998583BDAE1}"/>
+          <p:cNvPr id="24" name="CuadroTexto 23">
+            <a:extLst>
+              <a:ext uri="{FF2B5EF4-FFF2-40B4-BE49-F238E27FC236}">
+                <a16:creationId xmlns:a16="http://schemas.microsoft.com/office/drawing/2014/main" id="{04B47D01-5DA8-4499-BE5F-94E4DE916970}"/>
               </a:ext>
             </a:extLst>
           </p:cNvPr>
@@ -11575,7 +12180,470 @@
         </p:nvSpPr>
         <p:spPr>
           <a:xfrm>
-            <a:off x="800864" y="2585808"/>
+            <a:off x="8036463" y="925659"/>
+            <a:ext cx="2236001" cy="307777"/>
+          </a:xfrm>
+          <a:prstGeom prst="rect">
+            <a:avLst/>
+          </a:prstGeom>
+          <a:solidFill>
+            <a:schemeClr val="accent1">
+              <a:lumMod val="60000"/>
+              <a:lumOff val="40000"/>
+            </a:schemeClr>
+          </a:solidFill>
+          <a:ln>
+            <a:solidFill>
+              <a:schemeClr val="accent1">
+                <a:lumMod val="75000"/>
+              </a:schemeClr>
+            </a:solidFill>
+          </a:ln>
+        </p:spPr>
+        <p:txBody>
+          <a:bodyPr wrap="square" rtlCol="0">
+            <a:spAutoFit/>
+          </a:bodyPr>
+          <a:lstStyle/>
+          <a:p>
+            <a:pPr marL="0" marR="0" lvl="0" indent="0" algn="l" defTabSz="914400" rtl="0" eaLnBrk="0" fontAlgn="base" latinLnBrk="0" hangingPunct="0">
+              <a:lnSpc>
+                <a:spcPct val="100000"/>
+              </a:lnSpc>
+              <a:spcBef>
+                <a:spcPct val="0"/>
+              </a:spcBef>
+              <a:spcAft>
+                <a:spcPct val="0"/>
+              </a:spcAft>
+              <a:buClrTx/>
+              <a:buSzTx/>
+              <a:buFontTx/>
+              <a:buNone/>
+              <a:tabLst/>
+              <a:defRPr/>
+            </a:pPr>
+            <a:r>
+              <a:rPr kumimoji="0" lang="es-CL" sz="1400" b="0" i="0" u="none" strike="noStrike" kern="1200" cap="none" spc="0" normalizeH="0" baseline="0" noProof="0" dirty="0">
+                <a:ln>
+                  <a:noFill/>
+                </a:ln>
+                <a:solidFill>
+                  <a:prstClr val="black"/>
+                </a:solidFill>
+                <a:effectLst/>
+                <a:uLnTx/>
+                <a:uFillTx/>
+                <a:latin typeface="Times" pitchFamily="-97" charset="0"/>
+                <a:ea typeface="+mn-ea"/>
+                <a:cs typeface="+mn-cs"/>
+              </a:rPr>
+              <a:t>Impactos Cambio Climático</a:t>
+            </a:r>
+          </a:p>
+        </p:txBody>
+      </p:sp>
+      <p:cxnSp>
+        <p:nvCxnSpPr>
+          <p:cNvPr id="26" name="Conector recto de flecha 25">
+            <a:extLst>
+              <a:ext uri="{FF2B5EF4-FFF2-40B4-BE49-F238E27FC236}">
+                <a16:creationId xmlns:a16="http://schemas.microsoft.com/office/drawing/2014/main" id="{B80205CA-BC4B-4AC7-9C57-3A38F6587C5A}"/>
+              </a:ext>
+            </a:extLst>
+          </p:cNvPr>
+          <p:cNvCxnSpPr>
+            <a:cxnSpLocks/>
+          </p:cNvCxnSpPr>
+          <p:nvPr/>
+        </p:nvCxnSpPr>
+        <p:spPr>
+          <a:xfrm>
+            <a:off x="6705262" y="1268760"/>
+            <a:ext cx="1262946" cy="182174"/>
+          </a:xfrm>
+          <a:prstGeom prst="straightConnector1">
+            <a:avLst/>
+          </a:prstGeom>
+          <a:ln>
+            <a:solidFill>
+              <a:schemeClr val="tx2">
+                <a:lumMod val="75000"/>
+              </a:schemeClr>
+            </a:solidFill>
+            <a:tailEnd type="triangle"/>
+          </a:ln>
+        </p:spPr>
+        <p:style>
+          <a:lnRef idx="1">
+            <a:schemeClr val="accent1"/>
+          </a:lnRef>
+          <a:fillRef idx="0">
+            <a:schemeClr val="accent1"/>
+          </a:fillRef>
+          <a:effectRef idx="0">
+            <a:schemeClr val="accent1"/>
+          </a:effectRef>
+          <a:fontRef idx="minor">
+            <a:schemeClr val="tx1"/>
+          </a:fontRef>
+        </p:style>
+      </p:cxnSp>
+      <p:sp>
+        <p:nvSpPr>
+          <p:cNvPr id="28" name="CuadroTexto 27">
+            <a:extLst>
+              <a:ext uri="{FF2B5EF4-FFF2-40B4-BE49-F238E27FC236}">
+                <a16:creationId xmlns:a16="http://schemas.microsoft.com/office/drawing/2014/main" id="{7D1E1CA8-7844-48FC-BD23-2F607EAC0074}"/>
+              </a:ext>
+            </a:extLst>
+          </p:cNvPr>
+          <p:cNvSpPr txBox="1"/>
+          <p:nvPr/>
+        </p:nvSpPr>
+        <p:spPr>
+          <a:xfrm>
+            <a:off x="8036463" y="1309378"/>
+            <a:ext cx="2524033" cy="307777"/>
+          </a:xfrm>
+          <a:prstGeom prst="rect">
+            <a:avLst/>
+          </a:prstGeom>
+          <a:solidFill>
+            <a:schemeClr val="accent6">
+              <a:lumMod val="40000"/>
+              <a:lumOff val="60000"/>
+            </a:schemeClr>
+          </a:solidFill>
+          <a:ln>
+            <a:solidFill>
+              <a:schemeClr val="accent6">
+                <a:lumMod val="75000"/>
+              </a:schemeClr>
+            </a:solidFill>
+          </a:ln>
+        </p:spPr>
+        <p:txBody>
+          <a:bodyPr wrap="square" rtlCol="0">
+            <a:spAutoFit/>
+          </a:bodyPr>
+          <a:lstStyle/>
+          <a:p>
+            <a:pPr marL="0" marR="0" lvl="0" indent="0" algn="l" defTabSz="914400" rtl="0" eaLnBrk="0" fontAlgn="base" latinLnBrk="0" hangingPunct="0">
+              <a:lnSpc>
+                <a:spcPct val="100000"/>
+              </a:lnSpc>
+              <a:spcBef>
+                <a:spcPct val="0"/>
+              </a:spcBef>
+              <a:spcAft>
+                <a:spcPct val="0"/>
+              </a:spcAft>
+              <a:buClrTx/>
+              <a:buSzTx/>
+              <a:buFontTx/>
+              <a:buNone/>
+              <a:tabLst/>
+              <a:defRPr/>
+            </a:pPr>
+            <a:r>
+              <a:rPr kumimoji="0" lang="es-CL" sz="1400" b="0" i="0" u="none" strike="noStrike" kern="1200" cap="none" spc="0" normalizeH="0" baseline="0" noProof="0" dirty="0">
+                <a:ln>
+                  <a:noFill/>
+                </a:ln>
+                <a:solidFill>
+                  <a:prstClr val="black"/>
+                </a:solidFill>
+                <a:effectLst/>
+                <a:uLnTx/>
+                <a:uFillTx/>
+                <a:latin typeface="Times" pitchFamily="-97" charset="0"/>
+                <a:ea typeface="+mn-ea"/>
+                <a:cs typeface="+mn-cs"/>
+              </a:rPr>
+              <a:t>Proyecciones Cambio Climático</a:t>
+            </a:r>
+          </a:p>
+        </p:txBody>
+      </p:sp>
+      <p:cxnSp>
+        <p:nvCxnSpPr>
+          <p:cNvPr id="38" name="Conector recto de flecha 37">
+            <a:extLst>
+              <a:ext uri="{FF2B5EF4-FFF2-40B4-BE49-F238E27FC236}">
+                <a16:creationId xmlns:a16="http://schemas.microsoft.com/office/drawing/2014/main" id="{7B4CB9E4-BCF4-45F2-B0C7-AB589861469D}"/>
+              </a:ext>
+            </a:extLst>
+          </p:cNvPr>
+          <p:cNvCxnSpPr>
+            <a:cxnSpLocks/>
+          </p:cNvCxnSpPr>
+          <p:nvPr/>
+        </p:nvCxnSpPr>
+        <p:spPr>
+          <a:xfrm>
+            <a:off x="6705262" y="1268760"/>
+            <a:ext cx="1262946" cy="564781"/>
+          </a:xfrm>
+          <a:prstGeom prst="straightConnector1">
+            <a:avLst/>
+          </a:prstGeom>
+          <a:ln>
+            <a:solidFill>
+              <a:schemeClr val="tx2">
+                <a:lumMod val="75000"/>
+              </a:schemeClr>
+            </a:solidFill>
+            <a:tailEnd type="triangle"/>
+          </a:ln>
+        </p:spPr>
+        <p:style>
+          <a:lnRef idx="1">
+            <a:schemeClr val="accent1"/>
+          </a:lnRef>
+          <a:fillRef idx="0">
+            <a:schemeClr val="accent1"/>
+          </a:fillRef>
+          <a:effectRef idx="0">
+            <a:schemeClr val="accent1"/>
+          </a:effectRef>
+          <a:fontRef idx="minor">
+            <a:schemeClr val="tx1"/>
+          </a:fontRef>
+        </p:style>
+      </p:cxnSp>
+      <p:sp>
+        <p:nvSpPr>
+          <p:cNvPr id="40" name="CuadroTexto 39">
+            <a:extLst>
+              <a:ext uri="{FF2B5EF4-FFF2-40B4-BE49-F238E27FC236}">
+                <a16:creationId xmlns:a16="http://schemas.microsoft.com/office/drawing/2014/main" id="{328B240F-D295-43FD-9E81-25E246797ADE}"/>
+              </a:ext>
+            </a:extLst>
+          </p:cNvPr>
+          <p:cNvSpPr txBox="1"/>
+          <p:nvPr/>
+        </p:nvSpPr>
+        <p:spPr>
+          <a:xfrm>
+            <a:off x="8036462" y="1693638"/>
+            <a:ext cx="2524033" cy="307777"/>
+          </a:xfrm>
+          <a:prstGeom prst="rect">
+            <a:avLst/>
+          </a:prstGeom>
+          <a:solidFill>
+            <a:schemeClr val="tx2">
+              <a:lumMod val="40000"/>
+              <a:lumOff val="60000"/>
+            </a:schemeClr>
+          </a:solidFill>
+          <a:ln>
+            <a:solidFill>
+              <a:schemeClr val="tx2">
+                <a:lumMod val="75000"/>
+              </a:schemeClr>
+            </a:solidFill>
+          </a:ln>
+        </p:spPr>
+        <p:txBody>
+          <a:bodyPr wrap="square" rtlCol="0">
+            <a:spAutoFit/>
+          </a:bodyPr>
+          <a:lstStyle/>
+          <a:p>
+            <a:pPr marL="0" marR="0" lvl="0" indent="0" algn="l" defTabSz="914400" rtl="0" eaLnBrk="0" fontAlgn="base" latinLnBrk="0" hangingPunct="0">
+              <a:lnSpc>
+                <a:spcPct val="100000"/>
+              </a:lnSpc>
+              <a:spcBef>
+                <a:spcPct val="0"/>
+              </a:spcBef>
+              <a:spcAft>
+                <a:spcPct val="0"/>
+              </a:spcAft>
+              <a:buClrTx/>
+              <a:buSzTx/>
+              <a:buFontTx/>
+              <a:buNone/>
+              <a:tabLst/>
+              <a:defRPr/>
+            </a:pPr>
+            <a:r>
+              <a:rPr kumimoji="0" lang="es-CL" sz="1400" b="0" i="0" u="none" strike="noStrike" kern="1200" cap="none" spc="0" normalizeH="0" baseline="0" noProof="0" dirty="0">
+                <a:ln>
+                  <a:noFill/>
+                </a:ln>
+                <a:solidFill>
+                  <a:prstClr val="black"/>
+                </a:solidFill>
+                <a:effectLst/>
+                <a:uLnTx/>
+                <a:uFillTx/>
+                <a:latin typeface="Times" pitchFamily="-97" charset="0"/>
+                <a:ea typeface="+mn-ea"/>
+                <a:cs typeface="+mn-cs"/>
+              </a:rPr>
+              <a:t>Plataforma DATA CLIMA</a:t>
+            </a:r>
+          </a:p>
+        </p:txBody>
+      </p:sp>
+      <p:sp>
+        <p:nvSpPr>
+          <p:cNvPr id="43" name="CuadroTexto 42">
+            <a:extLst>
+              <a:ext uri="{FF2B5EF4-FFF2-40B4-BE49-F238E27FC236}">
+                <a16:creationId xmlns:a16="http://schemas.microsoft.com/office/drawing/2014/main" id="{58A3E1E0-89F1-449D-81EA-67CDD870137B}"/>
+              </a:ext>
+            </a:extLst>
+          </p:cNvPr>
+          <p:cNvSpPr txBox="1"/>
+          <p:nvPr/>
+        </p:nvSpPr>
+        <p:spPr>
+          <a:xfrm rot="16200000">
+            <a:off x="-1080869" y="3708006"/>
+            <a:ext cx="2767616" cy="461665"/>
+          </a:xfrm>
+          <a:prstGeom prst="rect">
+            <a:avLst/>
+          </a:prstGeom>
+          <a:noFill/>
+        </p:spPr>
+        <p:txBody>
+          <a:bodyPr wrap="square" rtlCol="0">
+            <a:spAutoFit/>
+          </a:bodyPr>
+          <a:lstStyle/>
+          <a:p>
+            <a:pPr marL="0" marR="0" lvl="0" indent="0" algn="l" defTabSz="914400" rtl="0" eaLnBrk="0" fontAlgn="base" latinLnBrk="0" hangingPunct="0">
+              <a:lnSpc>
+                <a:spcPct val="100000"/>
+              </a:lnSpc>
+              <a:spcBef>
+                <a:spcPct val="0"/>
+              </a:spcBef>
+              <a:spcAft>
+                <a:spcPct val="0"/>
+              </a:spcAft>
+              <a:buClrTx/>
+              <a:buSzTx/>
+              <a:buFontTx/>
+              <a:buNone/>
+              <a:tabLst/>
+              <a:defRPr/>
+            </a:pPr>
+            <a:r>
+              <a:rPr kumimoji="0" lang="es-CL" sz="2400" b="0" i="0" u="none" strike="noStrike" kern="1200" cap="none" spc="0" normalizeH="0" baseline="0" noProof="0" dirty="0">
+                <a:ln>
+                  <a:noFill/>
+                </a:ln>
+                <a:solidFill>
+                  <a:prstClr val="black"/>
+                </a:solidFill>
+                <a:effectLst/>
+                <a:uLnTx/>
+                <a:uFillTx/>
+                <a:latin typeface="Times" pitchFamily="-97" charset="0"/>
+                <a:ea typeface="+mn-ea"/>
+                <a:cs typeface="+mn-cs"/>
+              </a:rPr>
+              <a:t>PRODUCTOS</a:t>
+            </a:r>
+          </a:p>
+        </p:txBody>
+      </p:sp>
+      <p:sp>
+        <p:nvSpPr>
+          <p:cNvPr id="45" name="CuadroTexto 44">
+            <a:extLst>
+              <a:ext uri="{FF2B5EF4-FFF2-40B4-BE49-F238E27FC236}">
+                <a16:creationId xmlns:a16="http://schemas.microsoft.com/office/drawing/2014/main" id="{D8878651-2B27-4F39-AB19-230C2D492DC0}"/>
+              </a:ext>
+            </a:extLst>
+          </p:cNvPr>
+          <p:cNvSpPr txBox="1"/>
+          <p:nvPr/>
+        </p:nvSpPr>
+        <p:spPr>
+          <a:xfrm>
+            <a:off x="783736" y="2019585"/>
+            <a:ext cx="2091985" cy="307777"/>
+          </a:xfrm>
+          <a:prstGeom prst="rect">
+            <a:avLst/>
+          </a:prstGeom>
+          <a:solidFill>
+            <a:schemeClr val="accent4">
+              <a:lumMod val="40000"/>
+              <a:lumOff val="60000"/>
+            </a:schemeClr>
+          </a:solidFill>
+          <a:ln>
+            <a:solidFill>
+              <a:srgbClr val="FFC000"/>
+            </a:solidFill>
+          </a:ln>
+        </p:spPr>
+        <p:txBody>
+          <a:bodyPr wrap="square" rtlCol="0">
+            <a:spAutoFit/>
+          </a:bodyPr>
+          <a:lstStyle/>
+          <a:p>
+            <a:pPr marL="0" marR="0" lvl="0" indent="0" algn="l" defTabSz="914400" rtl="0" eaLnBrk="0" fontAlgn="base" latinLnBrk="0" hangingPunct="0">
+              <a:lnSpc>
+                <a:spcPct val="100000"/>
+              </a:lnSpc>
+              <a:spcBef>
+                <a:spcPct val="0"/>
+              </a:spcBef>
+              <a:spcAft>
+                <a:spcPct val="0"/>
+              </a:spcAft>
+              <a:buClrTx/>
+              <a:buSzTx/>
+              <a:buFontTx/>
+              <a:buNone/>
+              <a:tabLst/>
+              <a:defRPr/>
+            </a:pPr>
+            <a:r>
+              <a:rPr kumimoji="0" lang="es-CL" sz="1400" b="0" i="0" u="none" strike="noStrike" kern="1200" cap="none" spc="0" normalizeH="0" baseline="0" noProof="0" dirty="0">
+                <a:ln>
+                  <a:noFill/>
+                </a:ln>
+                <a:solidFill>
+                  <a:prstClr val="black"/>
+                </a:solidFill>
+                <a:effectLst/>
+                <a:uLnTx/>
+                <a:uFillTx/>
+                <a:latin typeface="Times" pitchFamily="-97" charset="0"/>
+                <a:ea typeface="+mn-ea"/>
+                <a:cs typeface="+mn-cs"/>
+              </a:rPr>
+              <a:t>Causas Cambio Climático</a:t>
+            </a:r>
+          </a:p>
+        </p:txBody>
+      </p:sp>
+      <p:sp>
+        <p:nvSpPr>
+          <p:cNvPr id="49" name="CuadroTexto 48">
+            <a:extLst>
+              <a:ext uri="{FF2B5EF4-FFF2-40B4-BE49-F238E27FC236}">
+                <a16:creationId xmlns:a16="http://schemas.microsoft.com/office/drawing/2014/main" id="{BD7C2829-65D1-49B9-ACED-7998583BDAE1}"/>
+              </a:ext>
+            </a:extLst>
+          </p:cNvPr>
+          <p:cNvSpPr txBox="1"/>
+          <p:nvPr/>
+        </p:nvSpPr>
+        <p:spPr>
+          <a:xfrm>
+            <a:off x="3265770" y="2585808"/>
             <a:ext cx="1512168" cy="461665"/>
           </a:xfrm>
           <a:prstGeom prst="rect">
@@ -11684,7 +12752,7 @@
         </p:nvSpPr>
         <p:spPr>
           <a:xfrm>
-            <a:off x="2381286" y="2585808"/>
+            <a:off x="4846192" y="2585808"/>
             <a:ext cx="1512168" cy="461665"/>
           </a:xfrm>
           <a:prstGeom prst="rect">
@@ -11793,7 +12861,7 @@
         </p:nvSpPr>
         <p:spPr>
           <a:xfrm>
-            <a:off x="2178093" y="2877408"/>
+            <a:off x="4642999" y="2877408"/>
             <a:ext cx="91225" cy="150350"/>
           </a:xfrm>
           <a:custGeom>
@@ -11978,7 +13046,7 @@
         </p:nvSpPr>
         <p:spPr>
           <a:xfrm>
-            <a:off x="787084" y="2456142"/>
+            <a:off x="3251990" y="2456142"/>
             <a:ext cx="3106370" cy="720080"/>
           </a:xfrm>
           <a:prstGeom prst="rect">
@@ -12059,7 +13127,7 @@
         </p:nvSpPr>
         <p:spPr>
           <a:xfrm>
-            <a:off x="783733" y="3681779"/>
+            <a:off x="4218350" y="3319358"/>
             <a:ext cx="2767851" cy="3139321"/>
           </a:xfrm>
           <a:prstGeom prst="rect">
@@ -12211,13 +13279,14 @@
           <p:cNvCxnSpPr>
             <a:cxnSpLocks/>
             <a:stCxn id="51" idx="2"/>
+            <a:endCxn id="27" idx="0"/>
           </p:cNvCxnSpPr>
           <p:nvPr/>
         </p:nvCxnSpPr>
         <p:spPr>
-          <a:xfrm flipH="1">
-            <a:off x="2001080" y="3047473"/>
-            <a:ext cx="1136290" cy="634306"/>
+          <a:xfrm>
+            <a:off x="5602276" y="3047473"/>
+            <a:ext cx="0" cy="271885"/>
           </a:xfrm>
           <a:prstGeom prst="straightConnector1">
             <a:avLst/>
@@ -12241,10 +13310,186 @@
           </a:fontRef>
         </p:style>
       </p:cxnSp>
+      <p:sp>
+        <p:nvSpPr>
+          <p:cNvPr id="3" name="CuadroTexto 2">
+            <a:extLst>
+              <a:ext uri="{FF2B5EF4-FFF2-40B4-BE49-F238E27FC236}">
+                <a16:creationId xmlns:a16="http://schemas.microsoft.com/office/drawing/2014/main" id="{8C190747-97CA-4683-A66C-AAF9AD9202EB}"/>
+              </a:ext>
+            </a:extLst>
+          </p:cNvPr>
+          <p:cNvSpPr txBox="1"/>
+          <p:nvPr/>
+        </p:nvSpPr>
+        <p:spPr>
+          <a:xfrm>
+            <a:off x="1163160" y="2585808"/>
+            <a:ext cx="1512168" cy="461665"/>
+          </a:xfrm>
+          <a:prstGeom prst="rect">
+            <a:avLst/>
+          </a:prstGeom>
+          <a:solidFill>
+            <a:schemeClr val="accent4">
+              <a:lumMod val="40000"/>
+              <a:lumOff val="60000"/>
+            </a:schemeClr>
+          </a:solidFill>
+          <a:ln w="28575">
+            <a:solidFill>
+              <a:srgbClr val="FFC000"/>
+            </a:solidFill>
+          </a:ln>
+        </p:spPr>
+        <p:txBody>
+          <a:bodyPr wrap="square" rtlCol="0">
+            <a:spAutoFit/>
+          </a:bodyPr>
+          <a:lstStyle/>
+          <a:p>
+            <a:pPr marL="0" marR="0" lvl="0" indent="0" algn="ctr" defTabSz="914400" rtl="0" eaLnBrk="0" fontAlgn="base" latinLnBrk="0" hangingPunct="0">
+              <a:lnSpc>
+                <a:spcPct val="100000"/>
+              </a:lnSpc>
+              <a:spcBef>
+                <a:spcPct val="0"/>
+              </a:spcBef>
+              <a:spcAft>
+                <a:spcPct val="0"/>
+              </a:spcAft>
+              <a:buClrTx/>
+              <a:buSzTx/>
+              <a:buFontTx/>
+              <a:buNone/>
+              <a:tabLst/>
+              <a:defRPr/>
+            </a:pPr>
+            <a:r>
+              <a:rPr kumimoji="0" lang="es-CL" sz="1200" b="0" i="0" u="none" strike="noStrike" kern="1200" cap="none" spc="0" normalizeH="0" baseline="0" noProof="0" dirty="0">
+                <a:ln>
+                  <a:noFill/>
+                </a:ln>
+                <a:solidFill>
+                  <a:prstClr val="black"/>
+                </a:solidFill>
+                <a:effectLst/>
+                <a:uLnTx/>
+                <a:uFillTx/>
+                <a:latin typeface="Times" pitchFamily="-97" charset="0"/>
+                <a:ea typeface="+mn-ea"/>
+                <a:cs typeface="+mn-cs"/>
+              </a:rPr>
+              <a:t>Causas CC Global</a:t>
+            </a:r>
+          </a:p>
+          <a:p>
+            <a:pPr marL="0" marR="0" lvl="0" indent="0" algn="ctr" defTabSz="914400" rtl="0" eaLnBrk="0" fontAlgn="base" latinLnBrk="0" hangingPunct="0">
+              <a:lnSpc>
+                <a:spcPct val="100000"/>
+              </a:lnSpc>
+              <a:spcBef>
+                <a:spcPct val="0"/>
+              </a:spcBef>
+              <a:spcAft>
+                <a:spcPct val="0"/>
+              </a:spcAft>
+              <a:buClrTx/>
+              <a:buSzTx/>
+              <a:buFontTx/>
+              <a:buNone/>
+              <a:tabLst/>
+              <a:defRPr/>
+            </a:pPr>
+            <a:r>
+              <a:rPr kumimoji="0" lang="es-CL" sz="1200" b="0" i="0" u="none" strike="noStrike" kern="1200" cap="none" spc="0" normalizeH="0" baseline="0" noProof="0" dirty="0">
+                <a:ln>
+                  <a:noFill/>
+                </a:ln>
+                <a:solidFill>
+                  <a:prstClr val="black"/>
+                </a:solidFill>
+                <a:effectLst/>
+                <a:uLnTx/>
+                <a:uFillTx/>
+                <a:latin typeface="Times" pitchFamily="-97" charset="0"/>
+                <a:ea typeface="+mn-ea"/>
+                <a:cs typeface="+mn-cs"/>
+              </a:rPr>
+              <a:t>(Word Completo)</a:t>
+            </a:r>
+          </a:p>
+        </p:txBody>
+      </p:sp>
+      <p:sp>
+        <p:nvSpPr>
+          <p:cNvPr id="4" name="CuadroTexto 3">
+            <a:extLst>
+              <a:ext uri="{FF2B5EF4-FFF2-40B4-BE49-F238E27FC236}">
+                <a16:creationId xmlns:a16="http://schemas.microsoft.com/office/drawing/2014/main" id="{D2ABC593-770D-42E4-8089-E07835FB9135}"/>
+              </a:ext>
+            </a:extLst>
+          </p:cNvPr>
+          <p:cNvSpPr txBox="1"/>
+          <p:nvPr/>
+        </p:nvSpPr>
+        <p:spPr>
+          <a:xfrm>
+            <a:off x="533772" y="3323969"/>
+            <a:ext cx="2584141" cy="1200329"/>
+          </a:xfrm>
+          <a:prstGeom prst="rect">
+            <a:avLst/>
+          </a:prstGeom>
+          <a:noFill/>
+          <a:ln>
+            <a:solidFill>
+              <a:schemeClr val="accent4">
+                <a:lumMod val="60000"/>
+                <a:lumOff val="40000"/>
+              </a:schemeClr>
+            </a:solidFill>
+          </a:ln>
+        </p:spPr>
+        <p:txBody>
+          <a:bodyPr wrap="square" numCol="1" rtlCol="0">
+            <a:spAutoFit/>
+          </a:bodyPr>
+          <a:lstStyle/>
+          <a:p>
+            <a:pPr marL="285750" indent="-285750">
+              <a:buFont typeface="Arial" panose="020B0604020202020204" pitchFamily="34" charset="0"/>
+              <a:buChar char="•"/>
+            </a:pPr>
+            <a:r>
+              <a:rPr lang="es-CL" dirty="0"/>
+              <a:t>Referir a Texto Causas</a:t>
+            </a:r>
+          </a:p>
+          <a:p>
+            <a:pPr marL="285750" indent="-285750">
+              <a:buFont typeface="Arial" panose="020B0604020202020204" pitchFamily="34" charset="0"/>
+              <a:buChar char="•"/>
+            </a:pPr>
+            <a:r>
+              <a:rPr lang="es-CL" dirty="0"/>
+              <a:t>Discutir si se utilizan figuras y </a:t>
+            </a:r>
+            <a:r>
+              <a:rPr lang="es-CL" dirty="0" err="1"/>
+              <a:t>GIFs</a:t>
+            </a:r>
+            <a:r>
+              <a:rPr lang="es-CL" dirty="0"/>
+              <a:t> adjuntos o si se crearán</a:t>
+            </a:r>
+          </a:p>
+        </p:txBody>
+      </p:sp>
     </p:spTree>
     <p:extLst>
       <p:ext uri="{BB962C8B-B14F-4D97-AF65-F5344CB8AC3E}">
-        <p14:creationId xmlns:p14="http://schemas.microsoft.com/office/powerpoint/2010/main" val="2643240212"/>
+        <p14:creationId xmlns:p14="http://schemas.microsoft.com/office/powerpoint/2010/main" val="3120762926"/>
       </p:ext>
     </p:extLst>
   </p:cSld>
@@ -12254,7 +13499,7 @@
 </p:sld>
 </file>
 
-<file path=ppt/slides/slide4.xml><?xml version="1.0" encoding="utf-8"?>
+<file path=ppt/slides/slide5.xml><?xml version="1.0" encoding="utf-8"?>
 <p:sld xmlns:a="http://schemas.openxmlformats.org/drawingml/2006/main" xmlns:r="http://schemas.openxmlformats.org/officeDocument/2006/relationships" xmlns:p="http://schemas.openxmlformats.org/presentationml/2006/main">
   <p:cSld>
     <p:spTree>

</xml_diff>